<commit_message>
#96, #92, #91, #89, #88, #87, #86, #85, #83, #63, #59
</commit_message>
<xml_diff>
--- a/documents/proposals/authentication.pptx
+++ b/documents/proposals/authentication.pptx
@@ -16,6 +16,7 @@
     <p:sldId id="266" r:id="rId10"/>
     <p:sldId id="264" r:id="rId11"/>
     <p:sldId id="267" r:id="rId12"/>
+    <p:sldId id="269" r:id="rId13"/>
   </p:sldIdLst>
   <p:sldSz cx="12192000" cy="6858000"/>
   <p:notesSz cx="6858000" cy="9144000"/>
@@ -130,6 +131,7 @@
             <p14:sldId id="266"/>
             <p14:sldId id="264"/>
             <p14:sldId id="267"/>
+            <p14:sldId id="269"/>
           </p14:sldIdLst>
         </p14:section>
       </p14:sectionLst>
@@ -309,7 +311,7 @@
           <a:p>
             <a:fld id="{479A7EA3-D718-4E90-A0D1-00B10EBBD16B}" type="datetimeFigureOut">
               <a:rPr lang="en-NL" smtClean="0"/>
-              <a:t>31/01/2020</a:t>
+              <a:t>19/02/2020</a:t>
             </a:fld>
             <a:endParaRPr lang="en-NL"/>
           </a:p>
@@ -537,7 +539,7 @@
           <a:p>
             <a:fld id="{479A7EA3-D718-4E90-A0D1-00B10EBBD16B}" type="datetimeFigureOut">
               <a:rPr lang="en-NL" smtClean="0"/>
-              <a:t>31/01/2020</a:t>
+              <a:t>19/02/2020</a:t>
             </a:fld>
             <a:endParaRPr lang="en-NL"/>
           </a:p>
@@ -717,7 +719,7 @@
           <a:p>
             <a:fld id="{479A7EA3-D718-4E90-A0D1-00B10EBBD16B}" type="datetimeFigureOut">
               <a:rPr lang="en-NL" smtClean="0"/>
-              <a:t>31/01/2020</a:t>
+              <a:t>19/02/2020</a:t>
             </a:fld>
             <a:endParaRPr lang="en-NL"/>
           </a:p>
@@ -931,7 +933,7 @@
             <a:fld id="{479A7EA3-D718-4E90-A0D1-00B10EBBD16B}" type="datetimeFigureOut">
               <a:rPr lang="en-NL" smtClean="0"/>
               <a:pPr/>
-              <a:t>31/01/2020</a:t>
+              <a:t>19/02/2020</a:t>
             </a:fld>
             <a:endParaRPr lang="en-NL"/>
           </a:p>
@@ -1228,7 +1230,7 @@
           <a:p>
             <a:fld id="{479A7EA3-D718-4E90-A0D1-00B10EBBD16B}" type="datetimeFigureOut">
               <a:rPr lang="en-NL" smtClean="0"/>
-              <a:t>31/01/2020</a:t>
+              <a:t>19/02/2020</a:t>
             </a:fld>
             <a:endParaRPr lang="en-NL"/>
           </a:p>
@@ -1554,7 +1556,7 @@
           <a:p>
             <a:fld id="{479A7EA3-D718-4E90-A0D1-00B10EBBD16B}" type="datetimeFigureOut">
               <a:rPr lang="en-NL" smtClean="0"/>
-              <a:t>31/01/2020</a:t>
+              <a:t>19/02/2020</a:t>
             </a:fld>
             <a:endParaRPr lang="en-NL"/>
           </a:p>
@@ -2005,7 +2007,7 @@
           <a:p>
             <a:fld id="{479A7EA3-D718-4E90-A0D1-00B10EBBD16B}" type="datetimeFigureOut">
               <a:rPr lang="en-NL" smtClean="0"/>
-              <a:t>31/01/2020</a:t>
+              <a:t>19/02/2020</a:t>
             </a:fld>
             <a:endParaRPr lang="en-NL"/>
           </a:p>
@@ -2123,7 +2125,7 @@
           <a:p>
             <a:fld id="{479A7EA3-D718-4E90-A0D1-00B10EBBD16B}" type="datetimeFigureOut">
               <a:rPr lang="en-NL" smtClean="0"/>
-              <a:t>31/01/2020</a:t>
+              <a:t>19/02/2020</a:t>
             </a:fld>
             <a:endParaRPr lang="en-NL"/>
           </a:p>
@@ -2218,7 +2220,7 @@
           <a:p>
             <a:fld id="{479A7EA3-D718-4E90-A0D1-00B10EBBD16B}" type="datetimeFigureOut">
               <a:rPr lang="en-NL" smtClean="0"/>
-              <a:t>31/01/2020</a:t>
+              <a:t>19/02/2020</a:t>
             </a:fld>
             <a:endParaRPr lang="en-NL"/>
           </a:p>
@@ -2505,7 +2507,7 @@
           <a:p>
             <a:fld id="{479A7EA3-D718-4E90-A0D1-00B10EBBD16B}" type="datetimeFigureOut">
               <a:rPr lang="en-NL" smtClean="0"/>
-              <a:t>31/01/2020</a:t>
+              <a:t>19/02/2020</a:t>
             </a:fld>
             <a:endParaRPr lang="en-NL"/>
           </a:p>
@@ -2830,7 +2832,7 @@
           <a:p>
             <a:fld id="{479A7EA3-D718-4E90-A0D1-00B10EBBD16B}" type="datetimeFigureOut">
               <a:rPr lang="en-NL" smtClean="0"/>
-              <a:t>31/01/2020</a:t>
+              <a:t>19/02/2020</a:t>
             </a:fld>
             <a:endParaRPr lang="en-NL"/>
           </a:p>
@@ -3084,7 +3086,7 @@
           <a:p>
             <a:fld id="{479A7EA3-D718-4E90-A0D1-00B10EBBD16B}" type="datetimeFigureOut">
               <a:rPr lang="en-NL" smtClean="0"/>
-              <a:t>31/01/2020</a:t>
+              <a:t>19/02/2020</a:t>
             </a:fld>
             <a:endParaRPr lang="en-NL"/>
           </a:p>
@@ -4954,6 +4956,108 @@
       <p:bldP spid="11" grpId="1"/>
     </p:bldLst>
   </p:timing>
+</p:sld>
+</file>
+
+<file path=ppt/slides/slide12.xml><?xml version="1.0" encoding="utf-8"?>
+<p:sld xmlns:a="http://schemas.openxmlformats.org/drawingml/2006/main" xmlns:r="http://schemas.openxmlformats.org/officeDocument/2006/relationships" xmlns:p="http://schemas.openxmlformats.org/presentationml/2006/main">
+  <p:cSld>
+    <p:spTree>
+      <p:nvGrpSpPr>
+        <p:cNvPr id="1" name=""/>
+        <p:cNvGrpSpPr/>
+        <p:nvPr/>
+      </p:nvGrpSpPr>
+      <p:grpSpPr>
+        <a:xfrm>
+          <a:off x="0" y="0"/>
+          <a:ext cx="0" cy="0"/>
+          <a:chOff x="0" y="0"/>
+          <a:chExt cx="0" cy="0"/>
+        </a:xfrm>
+      </p:grpSpPr>
+      <p:sp>
+        <p:nvSpPr>
+          <p:cNvPr id="2" name="Titel 1">
+            <a:extLst>
+              <a:ext uri="{FF2B5EF4-FFF2-40B4-BE49-F238E27FC236}">
+                <a16:creationId xmlns:a16="http://schemas.microsoft.com/office/drawing/2014/main" id="{86C0BAB7-827B-4D05-B1EE-F4D726E86363}"/>
+              </a:ext>
+            </a:extLst>
+          </p:cNvPr>
+          <p:cNvSpPr>
+            <a:spLocks noGrp="1"/>
+          </p:cNvSpPr>
+          <p:nvPr>
+            <p:ph type="title"/>
+          </p:nvPr>
+        </p:nvSpPr>
+        <p:spPr/>
+        <p:txBody>
+          <a:bodyPr/>
+          <a:lstStyle/>
+          <a:p>
+            <a:r>
+              <a:rPr lang="en-GB" dirty="0"/>
+              <a:t>After visit AMS Internet Exchange</a:t>
+            </a:r>
+            <a:endParaRPr lang="en-NL" dirty="0"/>
+          </a:p>
+        </p:txBody>
+      </p:sp>
+      <p:sp>
+        <p:nvSpPr>
+          <p:cNvPr id="3" name="Tijdelijke aanduiding voor inhoud 2">
+            <a:extLst>
+              <a:ext uri="{FF2B5EF4-FFF2-40B4-BE49-F238E27FC236}">
+                <a16:creationId xmlns:a16="http://schemas.microsoft.com/office/drawing/2014/main" id="{95A6AE21-D9E2-4AA5-A7F5-D56DF6D80C0B}"/>
+              </a:ext>
+            </a:extLst>
+          </p:cNvPr>
+          <p:cNvSpPr>
+            <a:spLocks noGrp="1"/>
+          </p:cNvSpPr>
+          <p:nvPr>
+            <p:ph idx="1"/>
+          </p:nvPr>
+        </p:nvSpPr>
+        <p:spPr/>
+        <p:txBody>
+          <a:bodyPr/>
+          <a:lstStyle/>
+          <a:p>
+            <a:r>
+              <a:rPr lang="en-GB" dirty="0"/>
+              <a:t>They actually can provide us a physical global network, separated from the internet.</a:t>
+            </a:r>
+          </a:p>
+          <a:p>
+            <a:r>
+              <a:rPr lang="en-GB" dirty="0"/>
+              <a:t>To make it more secure, but they don’t provide us answers about authentication… No </a:t>
+            </a:r>
+            <a:r>
+              <a:rPr lang="en-GB" dirty="0" err="1"/>
+              <a:t>Oauth</a:t>
+            </a:r>
+            <a:r>
+              <a:rPr lang="en-GB" dirty="0"/>
+              <a:t>, or whatever.</a:t>
+            </a:r>
+            <a:endParaRPr lang="en-NL" dirty="0"/>
+          </a:p>
+        </p:txBody>
+      </p:sp>
+    </p:spTree>
+    <p:extLst>
+      <p:ext uri="{BB962C8B-B14F-4D97-AF65-F5344CB8AC3E}">
+        <p14:creationId xmlns:p14="http://schemas.microsoft.com/office/powerpoint/2010/main" val="3213848365"/>
+      </p:ext>
+    </p:extLst>
+  </p:cSld>
+  <p:clrMapOvr>
+    <a:masterClrMapping/>
+  </p:clrMapOvr>
 </p:sld>
 </file>
 

</xml_diff>